<commit_message>
update the project report
complete the project report
</commit_message>
<xml_diff>
--- a/report/2017_Iot_A_LSY_01_프로젝트계획서_V01.pptx
+++ b/report/2017_Iot_A_LSY_01_프로젝트계획서_V01.pptx
@@ -10,6 +10,11 @@
   <p:sldIdLst>
     <p:sldId id="256" r:id="rId5"/>
     <p:sldId id="257" r:id="rId6"/>
+    <p:sldId id="258" r:id="rId7"/>
+    <p:sldId id="259" r:id="rId8"/>
+    <p:sldId id="260" r:id="rId9"/>
+    <p:sldId id="261" r:id="rId10"/>
+    <p:sldId id="262" r:id="rId11"/>
   </p:sldIdLst>
   <p:sldSz cy="5143500" cx="9144000"/>
   <p:notesSz cx="6858000" cy="9144000"/>
@@ -301,7 +306,7 @@
           </a:ln>
         </p:spPr>
         <p:txBody>
-          <a:bodyPr anchorCtr="0" anchor="t" bIns="91425" lIns="91425" rIns="91425" tIns="91425"/>
+          <a:bodyPr anchorCtr="0" anchor="t" bIns="91425" lIns="91425" rIns="91425" wrap="square" tIns="91425"/>
           <a:lstStyle>
             <a:lvl1pPr lvl="0">
               <a:spcBef>
@@ -454,7 +459,7 @@
           </a:prstGeom>
         </p:spPr>
         <p:txBody>
-          <a:bodyPr anchorCtr="0" anchor="t" bIns="91425" lIns="91425" rIns="91425" tIns="91425">
+          <a:bodyPr anchorCtr="0" anchor="t" bIns="91425" lIns="91425" rIns="91425" wrap="square" tIns="91425">
             <a:noAutofit/>
           </a:bodyPr>
           <a:lstStyle/>
@@ -549,7 +554,482 @@
           </a:prstGeom>
         </p:spPr>
         <p:txBody>
-          <a:bodyPr anchorCtr="0" anchor="t" bIns="91425" lIns="91425" rIns="91425" tIns="91425">
+          <a:bodyPr anchorCtr="0" anchor="t" bIns="91425" lIns="91425" rIns="91425" wrap="square" tIns="91425">
+            <a:noAutofit/>
+          </a:bodyPr>
+          <a:lstStyle/>
+          <a:p>
+            <a:pPr lvl="0">
+              <a:spcBef>
+                <a:spcPts val="0"/>
+              </a:spcBef>
+              <a:buNone/>
+            </a:pPr>
+            <a:r>
+              <a:t/>
+            </a:r>
+            <a:endParaRPr/>
+          </a:p>
+        </p:txBody>
+      </p:sp>
+    </p:spTree>
+  </p:cSld>
+  <p:clrMapOvr>
+    <a:masterClrMapping/>
+  </p:clrMapOvr>
+</p:notes>
+</file>
+
+<file path=ppt/notesSlides/notesSlide3.xml><?xml version="1.0" encoding="utf-8"?>
+<p:notes xmlns:a="http://schemas.openxmlformats.org/drawingml/2006/main" xmlns:r="http://schemas.openxmlformats.org/officeDocument/2006/relationships" xmlns:mc="http://schemas.openxmlformats.org/markup-compatibility/2006" xmlns:mv="urn:schemas-microsoft-com:mac:vml" xmlns:p="http://schemas.openxmlformats.org/presentationml/2006/main" xmlns:c="http://schemas.openxmlformats.org/drawingml/2006/chart" xmlns:dgm="http://schemas.openxmlformats.org/drawingml/2006/diagram" xmlns:o="urn:schemas-microsoft-com:office:office" xmlns:v="urn:schemas-microsoft-com:vml" xmlns:pvml="urn:schemas-microsoft-com:office:powerpoint" xmlns:com="http://schemas.openxmlformats.org/drawingml/2006/compatibility" xmlns:p14="http://schemas.microsoft.com/office/powerpoint/2010/main" xmlns:p15="http://schemas.microsoft.com/office/powerpoint/2012/main" showMasterPhAnim="0" showMasterSp="0">
+  <p:cSld>
+    <p:spTree>
+      <p:nvGrpSpPr>
+        <p:cNvPr id="62" name="Shape 62"/>
+        <p:cNvGrpSpPr/>
+        <p:nvPr/>
+      </p:nvGrpSpPr>
+      <p:grpSpPr>
+        <a:xfrm>
+          <a:off x="0" y="0"/>
+          <a:ext cx="0" cy="0"/>
+          <a:chOff x="0" y="0"/>
+          <a:chExt cx="0" cy="0"/>
+        </a:xfrm>
+      </p:grpSpPr>
+      <p:sp>
+        <p:nvSpPr>
+          <p:cNvPr id="63" name="Shape 63"/>
+          <p:cNvSpPr/>
+          <p:nvPr>
+            <p:ph idx="2" type="sldImg"/>
+          </p:nvPr>
+        </p:nvSpPr>
+        <p:spPr>
+          <a:xfrm>
+            <a:off x="381300" y="685800"/>
+            <a:ext cx="6096000" cy="3429000"/>
+          </a:xfrm>
+          <a:custGeom>
+            <a:pathLst>
+              <a:path extrusionOk="0" h="120000" w="120000">
+                <a:moveTo>
+                  <a:pt x="0" y="0"/>
+                </a:moveTo>
+                <a:lnTo>
+                  <a:pt x="120000" y="0"/>
+                </a:lnTo>
+                <a:lnTo>
+                  <a:pt x="120000" y="120000"/>
+                </a:lnTo>
+                <a:lnTo>
+                  <a:pt x="0" y="120000"/>
+                </a:lnTo>
+                <a:close/>
+              </a:path>
+            </a:pathLst>
+          </a:custGeom>
+        </p:spPr>
+      </p:sp>
+      <p:sp>
+        <p:nvSpPr>
+          <p:cNvPr id="64" name="Shape 64"/>
+          <p:cNvSpPr txBox="1"/>
+          <p:nvPr>
+            <p:ph idx="1" type="body"/>
+          </p:nvPr>
+        </p:nvSpPr>
+        <p:spPr>
+          <a:xfrm>
+            <a:off x="685800" y="4343400"/>
+            <a:ext cx="5486400" cy="4114800"/>
+          </a:xfrm>
+          <a:prstGeom prst="rect">
+            <a:avLst/>
+          </a:prstGeom>
+        </p:spPr>
+        <p:txBody>
+          <a:bodyPr anchorCtr="0" anchor="t" bIns="91425" lIns="91425" rIns="91425" wrap="square" tIns="91425">
+            <a:noAutofit/>
+          </a:bodyPr>
+          <a:lstStyle/>
+          <a:p>
+            <a:pPr lvl="0">
+              <a:spcBef>
+                <a:spcPts val="0"/>
+              </a:spcBef>
+              <a:buNone/>
+            </a:pPr>
+            <a:r>
+              <a:t/>
+            </a:r>
+            <a:endParaRPr/>
+          </a:p>
+        </p:txBody>
+      </p:sp>
+    </p:spTree>
+  </p:cSld>
+  <p:clrMapOvr>
+    <a:masterClrMapping/>
+  </p:clrMapOvr>
+</p:notes>
+</file>
+
+<file path=ppt/notesSlides/notesSlide4.xml><?xml version="1.0" encoding="utf-8"?>
+<p:notes xmlns:a="http://schemas.openxmlformats.org/drawingml/2006/main" xmlns:r="http://schemas.openxmlformats.org/officeDocument/2006/relationships" xmlns:mc="http://schemas.openxmlformats.org/markup-compatibility/2006" xmlns:mv="urn:schemas-microsoft-com:mac:vml" xmlns:p="http://schemas.openxmlformats.org/presentationml/2006/main" xmlns:c="http://schemas.openxmlformats.org/drawingml/2006/chart" xmlns:dgm="http://schemas.openxmlformats.org/drawingml/2006/diagram" xmlns:o="urn:schemas-microsoft-com:office:office" xmlns:v="urn:schemas-microsoft-com:vml" xmlns:pvml="urn:schemas-microsoft-com:office:powerpoint" xmlns:com="http://schemas.openxmlformats.org/drawingml/2006/compatibility" xmlns:p14="http://schemas.microsoft.com/office/powerpoint/2010/main" xmlns:p15="http://schemas.microsoft.com/office/powerpoint/2012/main" showMasterPhAnim="0" showMasterSp="0">
+  <p:cSld>
+    <p:spTree>
+      <p:nvGrpSpPr>
+        <p:cNvPr id="68" name="Shape 68"/>
+        <p:cNvGrpSpPr/>
+        <p:nvPr/>
+      </p:nvGrpSpPr>
+      <p:grpSpPr>
+        <a:xfrm>
+          <a:off x="0" y="0"/>
+          <a:ext cx="0" cy="0"/>
+          <a:chOff x="0" y="0"/>
+          <a:chExt cx="0" cy="0"/>
+        </a:xfrm>
+      </p:grpSpPr>
+      <p:sp>
+        <p:nvSpPr>
+          <p:cNvPr id="69" name="Shape 69"/>
+          <p:cNvSpPr/>
+          <p:nvPr>
+            <p:ph idx="2" type="sldImg"/>
+          </p:nvPr>
+        </p:nvSpPr>
+        <p:spPr>
+          <a:xfrm>
+            <a:off x="381300" y="685800"/>
+            <a:ext cx="6096000" cy="3429000"/>
+          </a:xfrm>
+          <a:custGeom>
+            <a:pathLst>
+              <a:path extrusionOk="0" h="120000" w="120000">
+                <a:moveTo>
+                  <a:pt x="0" y="0"/>
+                </a:moveTo>
+                <a:lnTo>
+                  <a:pt x="120000" y="0"/>
+                </a:lnTo>
+                <a:lnTo>
+                  <a:pt x="120000" y="120000"/>
+                </a:lnTo>
+                <a:lnTo>
+                  <a:pt x="0" y="120000"/>
+                </a:lnTo>
+                <a:close/>
+              </a:path>
+            </a:pathLst>
+          </a:custGeom>
+        </p:spPr>
+      </p:sp>
+      <p:sp>
+        <p:nvSpPr>
+          <p:cNvPr id="70" name="Shape 70"/>
+          <p:cNvSpPr txBox="1"/>
+          <p:nvPr>
+            <p:ph idx="1" type="body"/>
+          </p:nvPr>
+        </p:nvSpPr>
+        <p:spPr>
+          <a:xfrm>
+            <a:off x="685800" y="4343400"/>
+            <a:ext cx="5486400" cy="4114800"/>
+          </a:xfrm>
+          <a:prstGeom prst="rect">
+            <a:avLst/>
+          </a:prstGeom>
+        </p:spPr>
+        <p:txBody>
+          <a:bodyPr anchorCtr="0" anchor="t" bIns="91425" lIns="91425" rIns="91425" wrap="square" tIns="91425">
+            <a:noAutofit/>
+          </a:bodyPr>
+          <a:lstStyle/>
+          <a:p>
+            <a:pPr lvl="0">
+              <a:spcBef>
+                <a:spcPts val="0"/>
+              </a:spcBef>
+              <a:buNone/>
+            </a:pPr>
+            <a:r>
+              <a:t/>
+            </a:r>
+            <a:endParaRPr/>
+          </a:p>
+        </p:txBody>
+      </p:sp>
+    </p:spTree>
+  </p:cSld>
+  <p:clrMapOvr>
+    <a:masterClrMapping/>
+  </p:clrMapOvr>
+</p:notes>
+</file>
+
+<file path=ppt/notesSlides/notesSlide5.xml><?xml version="1.0" encoding="utf-8"?>
+<p:notes xmlns:a="http://schemas.openxmlformats.org/drawingml/2006/main" xmlns:r="http://schemas.openxmlformats.org/officeDocument/2006/relationships" xmlns:mc="http://schemas.openxmlformats.org/markup-compatibility/2006" xmlns:mv="urn:schemas-microsoft-com:mac:vml" xmlns:p="http://schemas.openxmlformats.org/presentationml/2006/main" xmlns:c="http://schemas.openxmlformats.org/drawingml/2006/chart" xmlns:dgm="http://schemas.openxmlformats.org/drawingml/2006/diagram" xmlns:o="urn:schemas-microsoft-com:office:office" xmlns:v="urn:schemas-microsoft-com:vml" xmlns:pvml="urn:schemas-microsoft-com:office:powerpoint" xmlns:com="http://schemas.openxmlformats.org/drawingml/2006/compatibility" xmlns:p14="http://schemas.microsoft.com/office/powerpoint/2010/main" xmlns:p15="http://schemas.microsoft.com/office/powerpoint/2012/main" showMasterPhAnim="0" showMasterSp="0">
+  <p:cSld>
+    <p:spTree>
+      <p:nvGrpSpPr>
+        <p:cNvPr id="74" name="Shape 74"/>
+        <p:cNvGrpSpPr/>
+        <p:nvPr/>
+      </p:nvGrpSpPr>
+      <p:grpSpPr>
+        <a:xfrm>
+          <a:off x="0" y="0"/>
+          <a:ext cx="0" cy="0"/>
+          <a:chOff x="0" y="0"/>
+          <a:chExt cx="0" cy="0"/>
+        </a:xfrm>
+      </p:grpSpPr>
+      <p:sp>
+        <p:nvSpPr>
+          <p:cNvPr id="75" name="Shape 75"/>
+          <p:cNvSpPr/>
+          <p:nvPr>
+            <p:ph idx="2" type="sldImg"/>
+          </p:nvPr>
+        </p:nvSpPr>
+        <p:spPr>
+          <a:xfrm>
+            <a:off x="381300" y="685800"/>
+            <a:ext cx="6096000" cy="3429000"/>
+          </a:xfrm>
+          <a:custGeom>
+            <a:pathLst>
+              <a:path extrusionOk="0" h="120000" w="120000">
+                <a:moveTo>
+                  <a:pt x="0" y="0"/>
+                </a:moveTo>
+                <a:lnTo>
+                  <a:pt x="120000" y="0"/>
+                </a:lnTo>
+                <a:lnTo>
+                  <a:pt x="120000" y="120000"/>
+                </a:lnTo>
+                <a:lnTo>
+                  <a:pt x="0" y="120000"/>
+                </a:lnTo>
+                <a:close/>
+              </a:path>
+            </a:pathLst>
+          </a:custGeom>
+        </p:spPr>
+      </p:sp>
+      <p:sp>
+        <p:nvSpPr>
+          <p:cNvPr id="76" name="Shape 76"/>
+          <p:cNvSpPr txBox="1"/>
+          <p:nvPr>
+            <p:ph idx="1" type="body"/>
+          </p:nvPr>
+        </p:nvSpPr>
+        <p:spPr>
+          <a:xfrm>
+            <a:off x="685800" y="4343400"/>
+            <a:ext cx="5486400" cy="4114800"/>
+          </a:xfrm>
+          <a:prstGeom prst="rect">
+            <a:avLst/>
+          </a:prstGeom>
+        </p:spPr>
+        <p:txBody>
+          <a:bodyPr anchorCtr="0" anchor="t" bIns="91425" lIns="91425" rIns="91425" wrap="square" tIns="91425">
+            <a:noAutofit/>
+          </a:bodyPr>
+          <a:lstStyle/>
+          <a:p>
+            <a:pPr lvl="0">
+              <a:spcBef>
+                <a:spcPts val="0"/>
+              </a:spcBef>
+              <a:buNone/>
+            </a:pPr>
+            <a:r>
+              <a:t/>
+            </a:r>
+            <a:endParaRPr/>
+          </a:p>
+        </p:txBody>
+      </p:sp>
+    </p:spTree>
+  </p:cSld>
+  <p:clrMapOvr>
+    <a:masterClrMapping/>
+  </p:clrMapOvr>
+</p:notes>
+</file>
+
+<file path=ppt/notesSlides/notesSlide6.xml><?xml version="1.0" encoding="utf-8"?>
+<p:notes xmlns:a="http://schemas.openxmlformats.org/drawingml/2006/main" xmlns:r="http://schemas.openxmlformats.org/officeDocument/2006/relationships" xmlns:mc="http://schemas.openxmlformats.org/markup-compatibility/2006" xmlns:mv="urn:schemas-microsoft-com:mac:vml" xmlns:p="http://schemas.openxmlformats.org/presentationml/2006/main" xmlns:c="http://schemas.openxmlformats.org/drawingml/2006/chart" xmlns:dgm="http://schemas.openxmlformats.org/drawingml/2006/diagram" xmlns:o="urn:schemas-microsoft-com:office:office" xmlns:v="urn:schemas-microsoft-com:vml" xmlns:pvml="urn:schemas-microsoft-com:office:powerpoint" xmlns:com="http://schemas.openxmlformats.org/drawingml/2006/compatibility" xmlns:p14="http://schemas.microsoft.com/office/powerpoint/2010/main" xmlns:p15="http://schemas.microsoft.com/office/powerpoint/2012/main" showMasterPhAnim="0" showMasterSp="0">
+  <p:cSld>
+    <p:spTree>
+      <p:nvGrpSpPr>
+        <p:cNvPr id="80" name="Shape 80"/>
+        <p:cNvGrpSpPr/>
+        <p:nvPr/>
+      </p:nvGrpSpPr>
+      <p:grpSpPr>
+        <a:xfrm>
+          <a:off x="0" y="0"/>
+          <a:ext cx="0" cy="0"/>
+          <a:chOff x="0" y="0"/>
+          <a:chExt cx="0" cy="0"/>
+        </a:xfrm>
+      </p:grpSpPr>
+      <p:sp>
+        <p:nvSpPr>
+          <p:cNvPr id="81" name="Shape 81"/>
+          <p:cNvSpPr/>
+          <p:nvPr>
+            <p:ph idx="2" type="sldImg"/>
+          </p:nvPr>
+        </p:nvSpPr>
+        <p:spPr>
+          <a:xfrm>
+            <a:off x="381300" y="685800"/>
+            <a:ext cx="6096000" cy="3429000"/>
+          </a:xfrm>
+          <a:custGeom>
+            <a:pathLst>
+              <a:path extrusionOk="0" h="120000" w="120000">
+                <a:moveTo>
+                  <a:pt x="0" y="0"/>
+                </a:moveTo>
+                <a:lnTo>
+                  <a:pt x="120000" y="0"/>
+                </a:lnTo>
+                <a:lnTo>
+                  <a:pt x="120000" y="120000"/>
+                </a:lnTo>
+                <a:lnTo>
+                  <a:pt x="0" y="120000"/>
+                </a:lnTo>
+                <a:close/>
+              </a:path>
+            </a:pathLst>
+          </a:custGeom>
+        </p:spPr>
+      </p:sp>
+      <p:sp>
+        <p:nvSpPr>
+          <p:cNvPr id="82" name="Shape 82"/>
+          <p:cNvSpPr txBox="1"/>
+          <p:nvPr>
+            <p:ph idx="1" type="body"/>
+          </p:nvPr>
+        </p:nvSpPr>
+        <p:spPr>
+          <a:xfrm>
+            <a:off x="685800" y="4343400"/>
+            <a:ext cx="5486400" cy="4114800"/>
+          </a:xfrm>
+          <a:prstGeom prst="rect">
+            <a:avLst/>
+          </a:prstGeom>
+        </p:spPr>
+        <p:txBody>
+          <a:bodyPr anchorCtr="0" anchor="t" bIns="91425" lIns="91425" rIns="91425" wrap="square" tIns="91425">
+            <a:noAutofit/>
+          </a:bodyPr>
+          <a:lstStyle/>
+          <a:p>
+            <a:pPr lvl="0">
+              <a:spcBef>
+                <a:spcPts val="0"/>
+              </a:spcBef>
+              <a:buNone/>
+            </a:pPr>
+            <a:r>
+              <a:t/>
+            </a:r>
+            <a:endParaRPr/>
+          </a:p>
+        </p:txBody>
+      </p:sp>
+    </p:spTree>
+  </p:cSld>
+  <p:clrMapOvr>
+    <a:masterClrMapping/>
+  </p:clrMapOvr>
+</p:notes>
+</file>
+
+<file path=ppt/notesSlides/notesSlide7.xml><?xml version="1.0" encoding="utf-8"?>
+<p:notes xmlns:a="http://schemas.openxmlformats.org/drawingml/2006/main" xmlns:r="http://schemas.openxmlformats.org/officeDocument/2006/relationships" xmlns:mc="http://schemas.openxmlformats.org/markup-compatibility/2006" xmlns:mv="urn:schemas-microsoft-com:mac:vml" xmlns:p="http://schemas.openxmlformats.org/presentationml/2006/main" xmlns:c="http://schemas.openxmlformats.org/drawingml/2006/chart" xmlns:dgm="http://schemas.openxmlformats.org/drawingml/2006/diagram" xmlns:o="urn:schemas-microsoft-com:office:office" xmlns:v="urn:schemas-microsoft-com:vml" xmlns:pvml="urn:schemas-microsoft-com:office:powerpoint" xmlns:com="http://schemas.openxmlformats.org/drawingml/2006/compatibility" xmlns:p14="http://schemas.microsoft.com/office/powerpoint/2010/main" xmlns:p15="http://schemas.microsoft.com/office/powerpoint/2012/main" showMasterPhAnim="0" showMasterSp="0">
+  <p:cSld>
+    <p:spTree>
+      <p:nvGrpSpPr>
+        <p:cNvPr id="86" name="Shape 86"/>
+        <p:cNvGrpSpPr/>
+        <p:nvPr/>
+      </p:nvGrpSpPr>
+      <p:grpSpPr>
+        <a:xfrm>
+          <a:off x="0" y="0"/>
+          <a:ext cx="0" cy="0"/>
+          <a:chOff x="0" y="0"/>
+          <a:chExt cx="0" cy="0"/>
+        </a:xfrm>
+      </p:grpSpPr>
+      <p:sp>
+        <p:nvSpPr>
+          <p:cNvPr id="87" name="Shape 87"/>
+          <p:cNvSpPr/>
+          <p:nvPr>
+            <p:ph idx="2" type="sldImg"/>
+          </p:nvPr>
+        </p:nvSpPr>
+        <p:spPr>
+          <a:xfrm>
+            <a:off x="381300" y="685800"/>
+            <a:ext cx="6096000" cy="3429000"/>
+          </a:xfrm>
+          <a:custGeom>
+            <a:pathLst>
+              <a:path extrusionOk="0" h="120000" w="120000">
+                <a:moveTo>
+                  <a:pt x="0" y="0"/>
+                </a:moveTo>
+                <a:lnTo>
+                  <a:pt x="120000" y="0"/>
+                </a:lnTo>
+                <a:lnTo>
+                  <a:pt x="120000" y="120000"/>
+                </a:lnTo>
+                <a:lnTo>
+                  <a:pt x="0" y="120000"/>
+                </a:lnTo>
+                <a:close/>
+              </a:path>
+            </a:pathLst>
+          </a:custGeom>
+        </p:spPr>
+      </p:sp>
+      <p:sp>
+        <p:nvSpPr>
+          <p:cNvPr id="88" name="Shape 88"/>
+          <p:cNvSpPr txBox="1"/>
+          <p:nvPr>
+            <p:ph idx="1" type="body"/>
+          </p:nvPr>
+        </p:nvSpPr>
+        <p:spPr>
+          <a:xfrm>
+            <a:off x="685800" y="4343400"/>
+            <a:ext cx="5486400" cy="4114800"/>
+          </a:xfrm>
+          <a:prstGeom prst="rect">
+            <a:avLst/>
+          </a:prstGeom>
+        </p:spPr>
+        <p:txBody>
+          <a:bodyPr anchorCtr="0" anchor="t" bIns="91425" lIns="91425" rIns="91425" wrap="square" tIns="91425">
             <a:noAutofit/>
           </a:bodyPr>
           <a:lstStyle/>
@@ -610,7 +1090,7 @@
           </a:prstGeom>
         </p:spPr>
         <p:txBody>
-          <a:bodyPr anchorCtr="0" anchor="b" bIns="91425" lIns="91425" rIns="91425" tIns="91425"/>
+          <a:bodyPr anchorCtr="0" anchor="b" bIns="91425" lIns="91425" rIns="91425" wrap="square" tIns="91425"/>
           <a:lstStyle>
             <a:lvl1pPr lvl="0" algn="ctr">
               <a:spcBef>
@@ -697,7 +1177,7 @@
           </a:prstGeom>
         </p:spPr>
         <p:txBody>
-          <a:bodyPr anchorCtr="0" anchor="t" bIns="91425" lIns="91425" rIns="91425" tIns="91425"/>
+          <a:bodyPr anchorCtr="0" anchor="t" bIns="91425" lIns="91425" rIns="91425" wrap="square" tIns="91425"/>
           <a:lstStyle>
             <a:lvl1pPr lvl="0" algn="ctr">
               <a:lnSpc>
@@ -847,7 +1327,7 @@
           </a:prstGeom>
         </p:spPr>
         <p:txBody>
-          <a:bodyPr anchorCtr="0" anchor="ctr" bIns="91425" lIns="91425" rIns="91425" tIns="91425">
+          <a:bodyPr anchorCtr="0" anchor="ctr" bIns="91425" lIns="91425" rIns="91425" wrap="square" tIns="91425">
             <a:noAutofit/>
           </a:bodyPr>
           <a:lstStyle/>
@@ -908,7 +1388,7 @@
           </a:prstGeom>
         </p:spPr>
         <p:txBody>
-          <a:bodyPr anchorCtr="0" anchor="b" bIns="91425" lIns="91425" rIns="91425" tIns="91425"/>
+          <a:bodyPr anchorCtr="0" anchor="b" bIns="91425" lIns="91425" rIns="91425" wrap="square" tIns="91425"/>
           <a:lstStyle>
             <a:lvl1pPr lvl="0" algn="ctr">
               <a:spcBef>
@@ -995,7 +1475,7 @@
           </a:prstGeom>
         </p:spPr>
         <p:txBody>
-          <a:bodyPr anchorCtr="0" anchor="t" bIns="91425" lIns="91425" rIns="91425" tIns="91425"/>
+          <a:bodyPr anchorCtr="0" anchor="t" bIns="91425" lIns="91425" rIns="91425" wrap="square" tIns="91425"/>
           <a:lstStyle>
             <a:lvl1pPr lvl="0" algn="ctr">
               <a:spcBef>
@@ -1073,7 +1553,7 @@
           </a:prstGeom>
         </p:spPr>
         <p:txBody>
-          <a:bodyPr anchorCtr="0" anchor="ctr" bIns="91425" lIns="91425" rIns="91425" tIns="91425">
+          <a:bodyPr anchorCtr="0" anchor="ctr" bIns="91425" lIns="91425" rIns="91425" wrap="square" tIns="91425">
             <a:noAutofit/>
           </a:bodyPr>
           <a:lstStyle/>
@@ -1134,7 +1614,7 @@
           </a:prstGeom>
         </p:spPr>
         <p:txBody>
-          <a:bodyPr anchorCtr="0" anchor="ctr" bIns="91425" lIns="91425" rIns="91425" tIns="91425">
+          <a:bodyPr anchorCtr="0" anchor="ctr" bIns="91425" lIns="91425" rIns="91425" wrap="square" tIns="91425">
             <a:noAutofit/>
           </a:bodyPr>
           <a:lstStyle/>
@@ -1195,7 +1675,7 @@
           </a:prstGeom>
         </p:spPr>
         <p:txBody>
-          <a:bodyPr anchorCtr="0" anchor="ctr" bIns="91425" lIns="91425" rIns="91425" tIns="91425"/>
+          <a:bodyPr anchorCtr="0" anchor="ctr" bIns="91425" lIns="91425" rIns="91425" wrap="square" tIns="91425"/>
           <a:lstStyle>
             <a:lvl1pPr lvl="0" algn="ctr">
               <a:spcBef>
@@ -1282,7 +1762,7 @@
           </a:prstGeom>
         </p:spPr>
         <p:txBody>
-          <a:bodyPr anchorCtr="0" anchor="ctr" bIns="91425" lIns="91425" rIns="91425" tIns="91425">
+          <a:bodyPr anchorCtr="0" anchor="ctr" bIns="91425" lIns="91425" rIns="91425" wrap="square" tIns="91425">
             <a:noAutofit/>
           </a:bodyPr>
           <a:lstStyle/>
@@ -1343,7 +1823,7 @@
           </a:prstGeom>
         </p:spPr>
         <p:txBody>
-          <a:bodyPr anchorCtr="0" anchor="t" bIns="91425" lIns="91425" rIns="91425" tIns="91425"/>
+          <a:bodyPr anchorCtr="0" anchor="t" bIns="91425" lIns="91425" rIns="91425" wrap="square" tIns="91425"/>
           <a:lstStyle>
             <a:lvl1pPr lvl="0">
               <a:spcBef>
@@ -1421,7 +1901,7 @@
           </a:prstGeom>
         </p:spPr>
         <p:txBody>
-          <a:bodyPr anchorCtr="0" anchor="t" bIns="91425" lIns="91425" rIns="91425" tIns="91425"/>
+          <a:bodyPr anchorCtr="0" anchor="t" bIns="91425" lIns="91425" rIns="91425" wrap="square" tIns="91425"/>
           <a:lstStyle>
             <a:lvl1pPr lvl="0">
               <a:spcBef>
@@ -1499,7 +1979,7 @@
           </a:prstGeom>
         </p:spPr>
         <p:txBody>
-          <a:bodyPr anchorCtr="0" anchor="ctr" bIns="91425" lIns="91425" rIns="91425" tIns="91425">
+          <a:bodyPr anchorCtr="0" anchor="ctr" bIns="91425" lIns="91425" rIns="91425" wrap="square" tIns="91425">
             <a:noAutofit/>
           </a:bodyPr>
           <a:lstStyle/>
@@ -1560,7 +2040,7 @@
           </a:prstGeom>
         </p:spPr>
         <p:txBody>
-          <a:bodyPr anchorCtr="0" anchor="t" bIns="91425" lIns="91425" rIns="91425" tIns="91425"/>
+          <a:bodyPr anchorCtr="0" anchor="t" bIns="91425" lIns="91425" rIns="91425" wrap="square" tIns="91425"/>
           <a:lstStyle>
             <a:lvl1pPr lvl="0">
               <a:spcBef>
@@ -1638,7 +2118,7 @@
           </a:prstGeom>
         </p:spPr>
         <p:txBody>
-          <a:bodyPr anchorCtr="0" anchor="t" bIns="91425" lIns="91425" rIns="91425" tIns="91425"/>
+          <a:bodyPr anchorCtr="0" anchor="t" bIns="91425" lIns="91425" rIns="91425" wrap="square" tIns="91425"/>
           <a:lstStyle>
             <a:lvl1pPr lvl="0">
               <a:spcBef>
@@ -1725,7 +2205,7 @@
           </a:prstGeom>
         </p:spPr>
         <p:txBody>
-          <a:bodyPr anchorCtr="0" anchor="t" bIns="91425" lIns="91425" rIns="91425" tIns="91425"/>
+          <a:bodyPr anchorCtr="0" anchor="t" bIns="91425" lIns="91425" rIns="91425" wrap="square" tIns="91425"/>
           <a:lstStyle>
             <a:lvl1pPr lvl="0">
               <a:spcBef>
@@ -1812,7 +2292,7 @@
           </a:prstGeom>
         </p:spPr>
         <p:txBody>
-          <a:bodyPr anchorCtr="0" anchor="ctr" bIns="91425" lIns="91425" rIns="91425" tIns="91425">
+          <a:bodyPr anchorCtr="0" anchor="ctr" bIns="91425" lIns="91425" rIns="91425" wrap="square" tIns="91425">
             <a:noAutofit/>
           </a:bodyPr>
           <a:lstStyle/>
@@ -1873,7 +2353,7 @@
           </a:prstGeom>
         </p:spPr>
         <p:txBody>
-          <a:bodyPr anchorCtr="0" anchor="t" bIns="91425" lIns="91425" rIns="91425" tIns="91425"/>
+          <a:bodyPr anchorCtr="0" anchor="t" bIns="91425" lIns="91425" rIns="91425" wrap="square" tIns="91425"/>
           <a:lstStyle>
             <a:lvl1pPr lvl="0">
               <a:spcBef>
@@ -1951,7 +2431,7 @@
           </a:prstGeom>
         </p:spPr>
         <p:txBody>
-          <a:bodyPr anchorCtr="0" anchor="ctr" bIns="91425" lIns="91425" rIns="91425" tIns="91425">
+          <a:bodyPr anchorCtr="0" anchor="ctr" bIns="91425" lIns="91425" rIns="91425" wrap="square" tIns="91425">
             <a:noAutofit/>
           </a:bodyPr>
           <a:lstStyle/>
@@ -2012,7 +2492,7 @@
           </a:prstGeom>
         </p:spPr>
         <p:txBody>
-          <a:bodyPr anchorCtr="0" anchor="b" bIns="91425" lIns="91425" rIns="91425" tIns="91425"/>
+          <a:bodyPr anchorCtr="0" anchor="b" bIns="91425" lIns="91425" rIns="91425" wrap="square" tIns="91425"/>
           <a:lstStyle>
             <a:lvl1pPr lvl="0">
               <a:spcBef>
@@ -2099,7 +2579,7 @@
           </a:prstGeom>
         </p:spPr>
         <p:txBody>
-          <a:bodyPr anchorCtr="0" anchor="t" bIns="91425" lIns="91425" rIns="91425" tIns="91425"/>
+          <a:bodyPr anchorCtr="0" anchor="t" bIns="91425" lIns="91425" rIns="91425" wrap="square" tIns="91425"/>
           <a:lstStyle>
             <a:lvl1pPr lvl="0">
               <a:spcBef>
@@ -2186,7 +2666,7 @@
           </a:prstGeom>
         </p:spPr>
         <p:txBody>
-          <a:bodyPr anchorCtr="0" anchor="ctr" bIns="91425" lIns="91425" rIns="91425" tIns="91425">
+          <a:bodyPr anchorCtr="0" anchor="ctr" bIns="91425" lIns="91425" rIns="91425" wrap="square" tIns="91425">
             <a:noAutofit/>
           </a:bodyPr>
           <a:lstStyle/>
@@ -2247,7 +2727,7 @@
           </a:prstGeom>
         </p:spPr>
         <p:txBody>
-          <a:bodyPr anchorCtr="0" anchor="ctr" bIns="91425" lIns="91425" rIns="91425" tIns="91425"/>
+          <a:bodyPr anchorCtr="0" anchor="ctr" bIns="91425" lIns="91425" rIns="91425" wrap="square" tIns="91425"/>
           <a:lstStyle>
             <a:lvl1pPr lvl="0">
               <a:spcBef>
@@ -2334,7 +2814,7 @@
           </a:prstGeom>
         </p:spPr>
         <p:txBody>
-          <a:bodyPr anchorCtr="0" anchor="ctr" bIns="91425" lIns="91425" rIns="91425" tIns="91425">
+          <a:bodyPr anchorCtr="0" anchor="ctr" bIns="91425" lIns="91425" rIns="91425" wrap="square" tIns="91425">
             <a:noAutofit/>
           </a:bodyPr>
           <a:lstStyle/>
@@ -2399,7 +2879,7 @@
           </a:ln>
         </p:spPr>
         <p:txBody>
-          <a:bodyPr anchorCtr="0" anchor="ctr" bIns="91425" lIns="91425" rIns="91425" tIns="91425">
+          <a:bodyPr anchorCtr="0" anchor="ctr" bIns="91425" lIns="91425" rIns="91425" wrap="square" tIns="91425">
             <a:noAutofit/>
           </a:bodyPr>
           <a:lstStyle/>
@@ -2435,7 +2915,7 @@
           </a:prstGeom>
         </p:spPr>
         <p:txBody>
-          <a:bodyPr anchorCtr="0" anchor="b" bIns="91425" lIns="91425" rIns="91425" tIns="91425"/>
+          <a:bodyPr anchorCtr="0" anchor="b" bIns="91425" lIns="91425" rIns="91425" wrap="square" tIns="91425"/>
           <a:lstStyle>
             <a:lvl1pPr lvl="0" algn="ctr">
               <a:spcBef>
@@ -2522,7 +3002,7 @@
           </a:prstGeom>
         </p:spPr>
         <p:txBody>
-          <a:bodyPr anchorCtr="0" anchor="t" bIns="91425" lIns="91425" rIns="91425" tIns="91425"/>
+          <a:bodyPr anchorCtr="0" anchor="t" bIns="91425" lIns="91425" rIns="91425" wrap="square" tIns="91425"/>
           <a:lstStyle>
             <a:lvl1pPr lvl="0" algn="ctr">
               <a:lnSpc>
@@ -2672,7 +3152,7 @@
           </a:prstGeom>
         </p:spPr>
         <p:txBody>
-          <a:bodyPr anchorCtr="0" anchor="ctr" bIns="91425" lIns="91425" rIns="91425" tIns="91425"/>
+          <a:bodyPr anchorCtr="0" anchor="ctr" bIns="91425" lIns="91425" rIns="91425" wrap="square" tIns="91425"/>
           <a:lstStyle>
             <a:lvl1pPr lvl="0">
               <a:spcBef>
@@ -2750,7 +3230,7 @@
           </a:prstGeom>
         </p:spPr>
         <p:txBody>
-          <a:bodyPr anchorCtr="0" anchor="ctr" bIns="91425" lIns="91425" rIns="91425" tIns="91425">
+          <a:bodyPr anchorCtr="0" anchor="ctr" bIns="91425" lIns="91425" rIns="91425" wrap="square" tIns="91425">
             <a:noAutofit/>
           </a:bodyPr>
           <a:lstStyle/>
@@ -2811,7 +3291,7 @@
           </a:prstGeom>
         </p:spPr>
         <p:txBody>
-          <a:bodyPr anchorCtr="0" anchor="ctr" bIns="91425" lIns="91425" rIns="91425" tIns="91425"/>
+          <a:bodyPr anchorCtr="0" anchor="ctr" bIns="91425" lIns="91425" rIns="91425" wrap="square" tIns="91425"/>
           <a:lstStyle>
             <a:lvl1pPr lvl="0">
               <a:lnSpc>
@@ -2848,7 +3328,7 @@
           </a:prstGeom>
         </p:spPr>
         <p:txBody>
-          <a:bodyPr anchorCtr="0" anchor="ctr" bIns="91425" lIns="91425" rIns="91425" tIns="91425">
+          <a:bodyPr anchorCtr="0" anchor="ctr" bIns="91425" lIns="91425" rIns="91425" wrap="square" tIns="91425">
             <a:noAutofit/>
           </a:bodyPr>
           <a:lstStyle/>
@@ -2920,7 +3400,7 @@
           </a:ln>
         </p:spPr>
         <p:txBody>
-          <a:bodyPr anchorCtr="0" anchor="t" bIns="91425" lIns="91425" rIns="91425" tIns="91425"/>
+          <a:bodyPr anchorCtr="0" anchor="t" bIns="91425" lIns="91425" rIns="91425" wrap="square" tIns="91425"/>
           <a:lstStyle>
             <a:lvl1pPr lvl="0">
               <a:spcBef>
@@ -3083,7 +3563,7 @@
           </a:ln>
         </p:spPr>
         <p:txBody>
-          <a:bodyPr anchorCtr="0" anchor="t" bIns="91425" lIns="91425" rIns="91425" tIns="91425"/>
+          <a:bodyPr anchorCtr="0" anchor="t" bIns="91425" lIns="91425" rIns="91425" wrap="square" tIns="91425"/>
           <a:lstStyle>
             <a:lvl1pPr lvl="0">
               <a:lnSpc>
@@ -3292,7 +3772,7 @@
           </a:ln>
         </p:spPr>
         <p:txBody>
-          <a:bodyPr anchorCtr="0" anchor="ctr" bIns="91425" lIns="91425" rIns="91425" tIns="91425">
+          <a:bodyPr anchorCtr="0" anchor="ctr" bIns="91425" lIns="91425" rIns="91425" wrap="square" tIns="91425">
             <a:noAutofit/>
           </a:bodyPr>
           <a:lstStyle/>
@@ -3801,15 +4281,15 @@
         </p:nvSpPr>
         <p:spPr>
           <a:xfrm>
-            <a:off x="707912" y="4626575"/>
-            <a:ext cx="8520600" cy="792600"/>
+            <a:off x="-1433325" y="4773825"/>
+            <a:ext cx="12106500" cy="792600"/>
           </a:xfrm>
           <a:prstGeom prst="rect">
             <a:avLst/>
           </a:prstGeom>
         </p:spPr>
         <p:txBody>
-          <a:bodyPr anchorCtr="0" anchor="t" bIns="91425" lIns="91425" rIns="91425" tIns="91425">
+          <a:bodyPr anchorCtr="0" anchor="t" bIns="91425" lIns="91425" rIns="91425" wrap="square" tIns="91425">
             <a:noAutofit/>
           </a:bodyPr>
           <a:lstStyle/>
@@ -3821,11 +4301,11 @@
               <a:buNone/>
             </a:pPr>
             <a:r>
-              <a:rPr lang="ko" sz="1400"/>
+              <a:rPr lang="ko" sz="1800"/>
               <a:t>작성일:2017.8.31 작성자:이성연 문서번호:</a:t>
             </a:r>
             <a:r>
-              <a:rPr lang="ko" sz="1400"/>
+              <a:rPr lang="ko" sz="1800"/>
               <a:t>2017_Iot_A_LSY_01_프로젝트계획서_V01</a:t>
             </a:r>
           </a:p>
@@ -3917,7 +4397,7 @@
           </a:prstGeom>
         </p:spPr>
         <p:txBody>
-          <a:bodyPr anchorCtr="0" anchor="b" bIns="91425" lIns="91425" rIns="91425" tIns="91425">
+          <a:bodyPr anchorCtr="0" anchor="b" bIns="91425" lIns="91425" rIns="91425" wrap="square" tIns="91425">
             <a:noAutofit/>
           </a:bodyPr>
           <a:lstStyle/>
@@ -3929,7 +4409,7 @@
               <a:buNone/>
             </a:pPr>
             <a:r>
-              <a:rPr lang="ko" sz="3600"/>
+              <a:rPr b="1" lang="ko" sz="3600"/>
               <a:t>목차</a:t>
             </a:r>
           </a:p>
@@ -3953,7 +4433,7 @@
           </a:prstGeom>
         </p:spPr>
         <p:txBody>
-          <a:bodyPr anchorCtr="0" anchor="t" bIns="91425" lIns="91425" rIns="91425" tIns="91425">
+          <a:bodyPr anchorCtr="0" anchor="t" bIns="91425" lIns="91425" rIns="91425" wrap="square" tIns="91425">
             <a:noAutofit/>
           </a:bodyPr>
           <a:lstStyle/>
@@ -4057,6 +4537,787 @@
               <a:t/>
             </a:r>
             <a:endParaRPr sz="2400"/>
+          </a:p>
+        </p:txBody>
+      </p:sp>
+    </p:spTree>
+  </p:cSld>
+  <p:clrMapOvr>
+    <a:masterClrMapping/>
+  </p:clrMapOvr>
+</p:sld>
+</file>
+
+<file path=ppt/slides/slide3.xml><?xml version="1.0" encoding="utf-8"?>
+<p:sld xmlns:a="http://schemas.openxmlformats.org/drawingml/2006/main" xmlns:r="http://schemas.openxmlformats.org/officeDocument/2006/relationships" xmlns:mc="http://schemas.openxmlformats.org/markup-compatibility/2006" xmlns:mv="urn:schemas-microsoft-com:mac:vml" xmlns:p="http://schemas.openxmlformats.org/presentationml/2006/main" xmlns:c="http://schemas.openxmlformats.org/drawingml/2006/chart" xmlns:dgm="http://schemas.openxmlformats.org/drawingml/2006/diagram" xmlns:o="urn:schemas-microsoft-com:office:office" xmlns:v="urn:schemas-microsoft-com:vml" xmlns:pvml="urn:schemas-microsoft-com:office:powerpoint" xmlns:com="http://schemas.openxmlformats.org/drawingml/2006/compatibility" xmlns:p14="http://schemas.microsoft.com/office/powerpoint/2010/main" xmlns:p15="http://schemas.microsoft.com/office/powerpoint/2012/main">
+  <p:cSld>
+    <p:spTree>
+      <p:nvGrpSpPr>
+        <p:cNvPr id="65" name="Shape 65"/>
+        <p:cNvGrpSpPr/>
+        <p:nvPr/>
+      </p:nvGrpSpPr>
+      <p:grpSpPr>
+        <a:xfrm>
+          <a:off x="0" y="0"/>
+          <a:ext cx="0" cy="0"/>
+          <a:chOff x="0" y="0"/>
+          <a:chExt cx="0" cy="0"/>
+        </a:xfrm>
+      </p:grpSpPr>
+      <p:sp>
+        <p:nvSpPr>
+          <p:cNvPr id="66" name="Shape 66"/>
+          <p:cNvSpPr txBox="1"/>
+          <p:nvPr>
+            <p:ph type="title"/>
+          </p:nvPr>
+        </p:nvSpPr>
+        <p:spPr>
+          <a:xfrm>
+            <a:off x="311700" y="445025"/>
+            <a:ext cx="8520600" cy="572700"/>
+          </a:xfrm>
+          <a:prstGeom prst="rect">
+            <a:avLst/>
+          </a:prstGeom>
+        </p:spPr>
+        <p:txBody>
+          <a:bodyPr anchorCtr="0" anchor="t" bIns="91425" lIns="91425" rIns="91425" wrap="square" tIns="91425">
+            <a:noAutofit/>
+          </a:bodyPr>
+          <a:lstStyle/>
+          <a:p>
+            <a:pPr lvl="0">
+              <a:spcBef>
+                <a:spcPts val="0"/>
+              </a:spcBef>
+              <a:buNone/>
+            </a:pPr>
+            <a:r>
+              <a:rPr b="1" lang="ko" sz="3000"/>
+              <a:t>개요</a:t>
+            </a:r>
+          </a:p>
+        </p:txBody>
+      </p:sp>
+      <p:sp>
+        <p:nvSpPr>
+          <p:cNvPr id="67" name="Shape 67"/>
+          <p:cNvSpPr txBox="1"/>
+          <p:nvPr>
+            <p:ph idx="1" type="body"/>
+          </p:nvPr>
+        </p:nvSpPr>
+        <p:spPr>
+          <a:xfrm>
+            <a:off x="1125300" y="1017725"/>
+            <a:ext cx="6893400" cy="3391500"/>
+          </a:xfrm>
+          <a:prstGeom prst="rect">
+            <a:avLst/>
+          </a:prstGeom>
+        </p:spPr>
+        <p:txBody>
+          <a:bodyPr anchorCtr="0" anchor="t" bIns="91425" lIns="91425" rIns="91425" wrap="square" tIns="91425">
+            <a:noAutofit/>
+          </a:bodyPr>
+          <a:lstStyle/>
+          <a:p>
+            <a:pPr lvl="0" rtl="0">
+              <a:spcBef>
+                <a:spcPts val="0"/>
+              </a:spcBef>
+              <a:buNone/>
+            </a:pPr>
+            <a:r>
+              <a:t/>
+            </a:r>
+            <a:endParaRPr sz="2400"/>
+          </a:p>
+          <a:p>
+            <a:pPr lvl="0">
+              <a:spcBef>
+                <a:spcPts val="0"/>
+              </a:spcBef>
+              <a:buNone/>
+            </a:pPr>
+            <a:r>
+              <a:rPr lang="ko" sz="2400"/>
+              <a:t>이 프로젝트는 타건 피아노나 신디 프로그램이 아닌 아두이노를 이용해 건반악기를 구현하는 것이다. 이 프로젝트를 만드는데에는 피에조 부저, 푸시 버튼 등이 필요 하다.</a:t>
+            </a:r>
+          </a:p>
+        </p:txBody>
+      </p:sp>
+    </p:spTree>
+  </p:cSld>
+  <p:clrMapOvr>
+    <a:masterClrMapping/>
+  </p:clrMapOvr>
+</p:sld>
+</file>
+
+<file path=ppt/slides/slide4.xml><?xml version="1.0" encoding="utf-8"?>
+<p:sld xmlns:a="http://schemas.openxmlformats.org/drawingml/2006/main" xmlns:r="http://schemas.openxmlformats.org/officeDocument/2006/relationships" xmlns:mc="http://schemas.openxmlformats.org/markup-compatibility/2006" xmlns:mv="urn:schemas-microsoft-com:mac:vml" xmlns:p="http://schemas.openxmlformats.org/presentationml/2006/main" xmlns:c="http://schemas.openxmlformats.org/drawingml/2006/chart" xmlns:dgm="http://schemas.openxmlformats.org/drawingml/2006/diagram" xmlns:o="urn:schemas-microsoft-com:office:office" xmlns:v="urn:schemas-microsoft-com:vml" xmlns:pvml="urn:schemas-microsoft-com:office:powerpoint" xmlns:com="http://schemas.openxmlformats.org/drawingml/2006/compatibility" xmlns:p14="http://schemas.microsoft.com/office/powerpoint/2010/main" xmlns:p15="http://schemas.microsoft.com/office/powerpoint/2012/main">
+  <p:cSld>
+    <p:spTree>
+      <p:nvGrpSpPr>
+        <p:cNvPr id="71" name="Shape 71"/>
+        <p:cNvGrpSpPr/>
+        <p:nvPr/>
+      </p:nvGrpSpPr>
+      <p:grpSpPr>
+        <a:xfrm>
+          <a:off x="0" y="0"/>
+          <a:ext cx="0" cy="0"/>
+          <a:chOff x="0" y="0"/>
+          <a:chExt cx="0" cy="0"/>
+        </a:xfrm>
+      </p:grpSpPr>
+      <p:sp>
+        <p:nvSpPr>
+          <p:cNvPr id="72" name="Shape 72"/>
+          <p:cNvSpPr txBox="1"/>
+          <p:nvPr>
+            <p:ph type="title"/>
+          </p:nvPr>
+        </p:nvSpPr>
+        <p:spPr>
+          <a:xfrm>
+            <a:off x="311700" y="445025"/>
+            <a:ext cx="8520600" cy="572700"/>
+          </a:xfrm>
+          <a:prstGeom prst="rect">
+            <a:avLst/>
+          </a:prstGeom>
+        </p:spPr>
+        <p:txBody>
+          <a:bodyPr anchorCtr="0" anchor="t" bIns="91425" lIns="91425" rIns="91425" wrap="square" tIns="91425">
+            <a:noAutofit/>
+          </a:bodyPr>
+          <a:lstStyle/>
+          <a:p>
+            <a:pPr lvl="0">
+              <a:spcBef>
+                <a:spcPts val="0"/>
+              </a:spcBef>
+              <a:buNone/>
+            </a:pPr>
+            <a:r>
+              <a:rPr b="1" lang="ko" sz="3000"/>
+              <a:t>프로젝트 설명</a:t>
+            </a:r>
+          </a:p>
+        </p:txBody>
+      </p:sp>
+      <p:sp>
+        <p:nvSpPr>
+          <p:cNvPr id="73" name="Shape 73"/>
+          <p:cNvSpPr txBox="1"/>
+          <p:nvPr>
+            <p:ph idx="1" type="body"/>
+          </p:nvPr>
+        </p:nvSpPr>
+        <p:spPr>
+          <a:xfrm>
+            <a:off x="311700" y="1289200"/>
+            <a:ext cx="5904600" cy="4085700"/>
+          </a:xfrm>
+          <a:prstGeom prst="rect">
+            <a:avLst/>
+          </a:prstGeom>
+        </p:spPr>
+        <p:txBody>
+          <a:bodyPr anchorCtr="0" anchor="t" bIns="91425" lIns="91425" rIns="91425" wrap="square" tIns="91425">
+            <a:noAutofit/>
+          </a:bodyPr>
+          <a:lstStyle/>
+          <a:p>
+            <a:pPr lvl="0">
+              <a:spcBef>
+                <a:spcPts val="0"/>
+              </a:spcBef>
+              <a:buNone/>
+            </a:pPr>
+            <a:r>
+              <a:rPr lang="ko"/>
+              <a:t>목표</a:t>
+            </a:r>
+          </a:p>
+          <a:p>
+            <a:pPr lvl="0">
+              <a:spcBef>
+                <a:spcPts val="0"/>
+              </a:spcBef>
+              <a:buNone/>
+            </a:pPr>
+            <a:r>
+              <a:rPr lang="ko"/>
+              <a:t>    - </a:t>
+            </a:r>
+            <a:r>
+              <a:rPr lang="ko"/>
+              <a:t>푸쉬 버튼과 피에조 버튼을  이용해 간단한 곡을  </a:t>
+            </a:r>
+          </a:p>
+          <a:p>
+            <a:pPr lvl="0" rtl="0">
+              <a:spcBef>
+                <a:spcPts val="0"/>
+              </a:spcBef>
+              <a:buNone/>
+            </a:pPr>
+            <a:r>
+              <a:rPr lang="ko"/>
+              <a:t>      연주할 수 있게 하는것</a:t>
+            </a:r>
+          </a:p>
+          <a:p>
+            <a:pPr lvl="0">
+              <a:spcBef>
+                <a:spcPts val="0"/>
+              </a:spcBef>
+              <a:buNone/>
+            </a:pPr>
+            <a:r>
+              <a:rPr lang="ko"/>
+              <a:t>구성</a:t>
+            </a:r>
+          </a:p>
+          <a:p>
+            <a:pPr lvl="0" rtl="0">
+              <a:spcBef>
+                <a:spcPts val="0"/>
+              </a:spcBef>
+              <a:buNone/>
+            </a:pPr>
+            <a:r>
+              <a:rPr lang="ko"/>
+              <a:t>    - </a:t>
+            </a:r>
+            <a:r>
+              <a:rPr lang="ko"/>
+              <a:t>HW : 아두이노, 푸시 버튼, 피에조 부저, 브래드 보드,</a:t>
+            </a:r>
+          </a:p>
+          <a:p>
+            <a:pPr lvl="0">
+              <a:spcBef>
+                <a:spcPts val="0"/>
+              </a:spcBef>
+              <a:buNone/>
+            </a:pPr>
+            <a:r>
+              <a:rPr lang="ko"/>
+              <a:t>               전선, 저항 </a:t>
+            </a:r>
+          </a:p>
+          <a:p>
+            <a:pPr lvl="0">
+              <a:spcBef>
+                <a:spcPts val="0"/>
+              </a:spcBef>
+              <a:buNone/>
+            </a:pPr>
+            <a:r>
+              <a:rPr lang="ko"/>
+              <a:t>    - SW : Arduino IDE 1.9.X, Visual Studio Code</a:t>
+            </a:r>
+          </a:p>
+        </p:txBody>
+      </p:sp>
+    </p:spTree>
+  </p:cSld>
+  <p:clrMapOvr>
+    <a:masterClrMapping/>
+  </p:clrMapOvr>
+</p:sld>
+</file>
+
+<file path=ppt/slides/slide5.xml><?xml version="1.0" encoding="utf-8"?>
+<p:sld xmlns:a="http://schemas.openxmlformats.org/drawingml/2006/main" xmlns:r="http://schemas.openxmlformats.org/officeDocument/2006/relationships" xmlns:mc="http://schemas.openxmlformats.org/markup-compatibility/2006" xmlns:mv="urn:schemas-microsoft-com:mac:vml" xmlns:p="http://schemas.openxmlformats.org/presentationml/2006/main" xmlns:c="http://schemas.openxmlformats.org/drawingml/2006/chart" xmlns:dgm="http://schemas.openxmlformats.org/drawingml/2006/diagram" xmlns:o="urn:schemas-microsoft-com:office:office" xmlns:v="urn:schemas-microsoft-com:vml" xmlns:pvml="urn:schemas-microsoft-com:office:powerpoint" xmlns:com="http://schemas.openxmlformats.org/drawingml/2006/compatibility" xmlns:p14="http://schemas.microsoft.com/office/powerpoint/2010/main" xmlns:p15="http://schemas.microsoft.com/office/powerpoint/2012/main">
+  <p:cSld>
+    <p:spTree>
+      <p:nvGrpSpPr>
+        <p:cNvPr id="77" name="Shape 77"/>
+        <p:cNvGrpSpPr/>
+        <p:nvPr/>
+      </p:nvGrpSpPr>
+      <p:grpSpPr>
+        <a:xfrm>
+          <a:off x="0" y="0"/>
+          <a:ext cx="0" cy="0"/>
+          <a:chOff x="0" y="0"/>
+          <a:chExt cx="0" cy="0"/>
+        </a:xfrm>
+      </p:grpSpPr>
+      <p:sp>
+        <p:nvSpPr>
+          <p:cNvPr id="78" name="Shape 78"/>
+          <p:cNvSpPr txBox="1"/>
+          <p:nvPr>
+            <p:ph type="title"/>
+          </p:nvPr>
+        </p:nvSpPr>
+        <p:spPr>
+          <a:xfrm>
+            <a:off x="311700" y="445025"/>
+            <a:ext cx="8520600" cy="572700"/>
+          </a:xfrm>
+          <a:prstGeom prst="rect">
+            <a:avLst/>
+          </a:prstGeom>
+        </p:spPr>
+        <p:txBody>
+          <a:bodyPr anchorCtr="0" anchor="t" bIns="91425" lIns="91425" rIns="91425" wrap="square" tIns="91425">
+            <a:noAutofit/>
+          </a:bodyPr>
+          <a:lstStyle/>
+          <a:p>
+            <a:pPr lvl="0">
+              <a:spcBef>
+                <a:spcPts val="0"/>
+              </a:spcBef>
+              <a:buNone/>
+            </a:pPr>
+            <a:r>
+              <a:rPr b="1" lang="ko" sz="3000"/>
+              <a:t>프로젝트 목표 기능</a:t>
+            </a:r>
+          </a:p>
+        </p:txBody>
+      </p:sp>
+      <p:sp>
+        <p:nvSpPr>
+          <p:cNvPr id="79" name="Shape 79"/>
+          <p:cNvSpPr txBox="1"/>
+          <p:nvPr>
+            <p:ph idx="1" type="body"/>
+          </p:nvPr>
+        </p:nvSpPr>
+        <p:spPr>
+          <a:xfrm>
+            <a:off x="311700" y="1152475"/>
+            <a:ext cx="4590000" cy="3416400"/>
+          </a:xfrm>
+          <a:prstGeom prst="rect">
+            <a:avLst/>
+          </a:prstGeom>
+        </p:spPr>
+        <p:txBody>
+          <a:bodyPr anchorCtr="0" anchor="t" bIns="91425" lIns="91425" rIns="91425" wrap="square" tIns="91425">
+            <a:noAutofit/>
+          </a:bodyPr>
+          <a:lstStyle/>
+          <a:p>
+            <a:pPr lvl="0">
+              <a:spcBef>
+                <a:spcPts val="0"/>
+              </a:spcBef>
+              <a:buNone/>
+            </a:pPr>
+            <a:r>
+              <a:t/>
+            </a:r>
+            <a:endParaRPr/>
+          </a:p>
+          <a:p>
+            <a:pPr lvl="0">
+              <a:spcBef>
+                <a:spcPts val="0"/>
+              </a:spcBef>
+              <a:buNone/>
+            </a:pPr>
+            <a:r>
+              <a:t/>
+            </a:r>
+            <a:endParaRPr/>
+          </a:p>
+          <a:p>
+            <a:pPr lvl="0">
+              <a:spcBef>
+                <a:spcPts val="0"/>
+              </a:spcBef>
+              <a:buNone/>
+            </a:pPr>
+            <a:r>
+              <a:rPr lang="ko"/>
+              <a:t>해당 건반(푸시 버튼)을 누르면 그에 맞는 음이 피에조 부저를 통해 나온다.</a:t>
+            </a:r>
+          </a:p>
+        </p:txBody>
+      </p:sp>
+    </p:spTree>
+  </p:cSld>
+  <p:clrMapOvr>
+    <a:masterClrMapping/>
+  </p:clrMapOvr>
+</p:sld>
+</file>
+
+<file path=ppt/slides/slide6.xml><?xml version="1.0" encoding="utf-8"?>
+<p:sld xmlns:a="http://schemas.openxmlformats.org/drawingml/2006/main" xmlns:r="http://schemas.openxmlformats.org/officeDocument/2006/relationships" xmlns:mc="http://schemas.openxmlformats.org/markup-compatibility/2006" xmlns:mv="urn:schemas-microsoft-com:mac:vml" xmlns:p="http://schemas.openxmlformats.org/presentationml/2006/main" xmlns:c="http://schemas.openxmlformats.org/drawingml/2006/chart" xmlns:dgm="http://schemas.openxmlformats.org/drawingml/2006/diagram" xmlns:o="urn:schemas-microsoft-com:office:office" xmlns:v="urn:schemas-microsoft-com:vml" xmlns:pvml="urn:schemas-microsoft-com:office:powerpoint" xmlns:com="http://schemas.openxmlformats.org/drawingml/2006/compatibility" xmlns:p14="http://schemas.microsoft.com/office/powerpoint/2010/main" xmlns:p15="http://schemas.microsoft.com/office/powerpoint/2012/main">
+  <p:cSld>
+    <p:spTree>
+      <p:nvGrpSpPr>
+        <p:cNvPr id="83" name="Shape 83"/>
+        <p:cNvGrpSpPr/>
+        <p:nvPr/>
+      </p:nvGrpSpPr>
+      <p:grpSpPr>
+        <a:xfrm>
+          <a:off x="0" y="0"/>
+          <a:ext cx="0" cy="0"/>
+          <a:chOff x="0" y="0"/>
+          <a:chExt cx="0" cy="0"/>
+        </a:xfrm>
+      </p:grpSpPr>
+      <p:sp>
+        <p:nvSpPr>
+          <p:cNvPr id="84" name="Shape 84"/>
+          <p:cNvSpPr txBox="1"/>
+          <p:nvPr>
+            <p:ph type="title"/>
+          </p:nvPr>
+        </p:nvSpPr>
+        <p:spPr>
+          <a:xfrm>
+            <a:off x="311700" y="245175"/>
+            <a:ext cx="8520600" cy="572700"/>
+          </a:xfrm>
+          <a:prstGeom prst="rect">
+            <a:avLst/>
+          </a:prstGeom>
+        </p:spPr>
+        <p:txBody>
+          <a:bodyPr anchorCtr="0" anchor="t" bIns="91425" lIns="91425" rIns="91425" wrap="square" tIns="91425">
+            <a:noAutofit/>
+          </a:bodyPr>
+          <a:lstStyle/>
+          <a:p>
+            <a:pPr lvl="0">
+              <a:spcBef>
+                <a:spcPts val="0"/>
+              </a:spcBef>
+              <a:buNone/>
+            </a:pPr>
+            <a:r>
+              <a:rPr b="1" lang="ko" sz="3000"/>
+              <a:t>산출물</a:t>
+            </a:r>
+          </a:p>
+        </p:txBody>
+      </p:sp>
+      <p:sp>
+        <p:nvSpPr>
+          <p:cNvPr id="85" name="Shape 85"/>
+          <p:cNvSpPr txBox="1"/>
+          <p:nvPr>
+            <p:ph idx="1" type="body"/>
+          </p:nvPr>
+        </p:nvSpPr>
+        <p:spPr>
+          <a:xfrm>
+            <a:off x="311700" y="1017725"/>
+            <a:ext cx="8520600" cy="3416400"/>
+          </a:xfrm>
+          <a:prstGeom prst="rect">
+            <a:avLst/>
+          </a:prstGeom>
+        </p:spPr>
+        <p:txBody>
+          <a:bodyPr anchorCtr="0" anchor="t" bIns="91425" lIns="91425" rIns="91425" wrap="square" tIns="91425">
+            <a:noAutofit/>
+          </a:bodyPr>
+          <a:lstStyle/>
+          <a:p>
+            <a:pPr lvl="0">
+              <a:spcBef>
+                <a:spcPts val="0"/>
+              </a:spcBef>
+              <a:buNone/>
+            </a:pPr>
+            <a:r>
+              <a:rPr lang="ko"/>
+              <a:t>프로젝트 계획서</a:t>
+            </a:r>
+          </a:p>
+          <a:p>
+            <a:pPr lvl="0">
+              <a:spcBef>
+                <a:spcPts val="0"/>
+              </a:spcBef>
+              <a:buNone/>
+            </a:pPr>
+            <a:r>
+              <a:rPr lang="ko"/>
+              <a:t>GitHub 저장소</a:t>
+            </a:r>
+          </a:p>
+          <a:p>
+            <a:pPr lvl="0">
+              <a:spcBef>
+                <a:spcPts val="0"/>
+              </a:spcBef>
+              <a:buNone/>
+            </a:pPr>
+            <a:r>
+              <a:rPr lang="ko"/>
+              <a:t>컨셉 디자인</a:t>
+            </a:r>
+          </a:p>
+          <a:p>
+            <a:pPr lvl="0">
+              <a:spcBef>
+                <a:spcPts val="0"/>
+              </a:spcBef>
+              <a:buNone/>
+            </a:pPr>
+            <a:r>
+              <a:rPr lang="ko"/>
+              <a:t>개발일지</a:t>
+            </a:r>
+          </a:p>
+          <a:p>
+            <a:pPr lvl="0">
+              <a:spcBef>
+                <a:spcPts val="0"/>
+              </a:spcBef>
+              <a:buNone/>
+            </a:pPr>
+            <a:r>
+              <a:rPr lang="ko"/>
+              <a:t>디자인 초안</a:t>
+            </a:r>
+          </a:p>
+          <a:p>
+            <a:pPr lvl="0">
+              <a:spcBef>
+                <a:spcPts val="0"/>
+              </a:spcBef>
+              <a:buNone/>
+            </a:pPr>
+            <a:r>
+              <a:rPr lang="ko"/>
+              <a:t>프로토 타입 디자인</a:t>
+            </a:r>
+          </a:p>
+          <a:p>
+            <a:pPr lvl="0">
+              <a:spcBef>
+                <a:spcPts val="0"/>
+              </a:spcBef>
+              <a:buNone/>
+            </a:pPr>
+            <a:r>
+              <a:rPr lang="ko"/>
+              <a:t>프로젝트 보고서</a:t>
+            </a:r>
+          </a:p>
+          <a:p>
+            <a:pPr lvl="0">
+              <a:spcBef>
+                <a:spcPts val="0"/>
+              </a:spcBef>
+              <a:buNone/>
+            </a:pPr>
+            <a:r>
+              <a:rPr lang="ko"/>
+              <a:t>완료 보고서</a:t>
+            </a:r>
+          </a:p>
+        </p:txBody>
+      </p:sp>
+    </p:spTree>
+  </p:cSld>
+  <p:clrMapOvr>
+    <a:masterClrMapping/>
+  </p:clrMapOvr>
+</p:sld>
+</file>
+
+<file path=ppt/slides/slide7.xml><?xml version="1.0" encoding="utf-8"?>
+<p:sld xmlns:a="http://schemas.openxmlformats.org/drawingml/2006/main" xmlns:r="http://schemas.openxmlformats.org/officeDocument/2006/relationships" xmlns:mc="http://schemas.openxmlformats.org/markup-compatibility/2006" xmlns:mv="urn:schemas-microsoft-com:mac:vml" xmlns:p="http://schemas.openxmlformats.org/presentationml/2006/main" xmlns:c="http://schemas.openxmlformats.org/drawingml/2006/chart" xmlns:dgm="http://schemas.openxmlformats.org/drawingml/2006/diagram" xmlns:o="urn:schemas-microsoft-com:office:office" xmlns:v="urn:schemas-microsoft-com:vml" xmlns:pvml="urn:schemas-microsoft-com:office:powerpoint" xmlns:com="http://schemas.openxmlformats.org/drawingml/2006/compatibility" xmlns:p14="http://schemas.microsoft.com/office/powerpoint/2010/main" xmlns:p15="http://schemas.microsoft.com/office/powerpoint/2012/main">
+  <p:cSld>
+    <p:spTree>
+      <p:nvGrpSpPr>
+        <p:cNvPr id="89" name="Shape 89"/>
+        <p:cNvGrpSpPr/>
+        <p:nvPr/>
+      </p:nvGrpSpPr>
+      <p:grpSpPr>
+        <a:xfrm>
+          <a:off x="0" y="0"/>
+          <a:ext cx="0" cy="0"/>
+          <a:chOff x="0" y="0"/>
+          <a:chExt cx="0" cy="0"/>
+        </a:xfrm>
+      </p:grpSpPr>
+      <p:sp>
+        <p:nvSpPr>
+          <p:cNvPr id="90" name="Shape 90"/>
+          <p:cNvSpPr txBox="1"/>
+          <p:nvPr>
+            <p:ph type="title"/>
+          </p:nvPr>
+        </p:nvSpPr>
+        <p:spPr>
+          <a:xfrm>
+            <a:off x="311700" y="445025"/>
+            <a:ext cx="8520600" cy="572700"/>
+          </a:xfrm>
+          <a:prstGeom prst="rect">
+            <a:avLst/>
+          </a:prstGeom>
+        </p:spPr>
+        <p:txBody>
+          <a:bodyPr anchorCtr="0" anchor="t" bIns="91425" lIns="91425" rIns="91425" wrap="square" tIns="91425">
+            <a:noAutofit/>
+          </a:bodyPr>
+          <a:lstStyle/>
+          <a:p>
+            <a:pPr lvl="0">
+              <a:spcBef>
+                <a:spcPts val="0"/>
+              </a:spcBef>
+              <a:buNone/>
+            </a:pPr>
+            <a:r>
+              <a:rPr b="1" lang="ko" sz="3000"/>
+              <a:t>프로젝트 일정 계획</a:t>
+            </a:r>
+          </a:p>
+        </p:txBody>
+      </p:sp>
+      <p:sp>
+        <p:nvSpPr>
+          <p:cNvPr id="91" name="Shape 91"/>
+          <p:cNvSpPr txBox="1"/>
+          <p:nvPr>
+            <p:ph idx="1" type="body"/>
+          </p:nvPr>
+        </p:nvSpPr>
+        <p:spPr>
+          <a:xfrm>
+            <a:off x="311700" y="1404900"/>
+            <a:ext cx="8520600" cy="3416400"/>
+          </a:xfrm>
+          <a:prstGeom prst="rect">
+            <a:avLst/>
+          </a:prstGeom>
+        </p:spPr>
+        <p:txBody>
+          <a:bodyPr anchorCtr="0" anchor="t" bIns="91425" lIns="91425" rIns="91425" wrap="square" tIns="91425">
+            <a:noAutofit/>
+          </a:bodyPr>
+          <a:lstStyle/>
+          <a:p>
+            <a:pPr lvl="0">
+              <a:spcBef>
+                <a:spcPts val="0"/>
+              </a:spcBef>
+              <a:buNone/>
+            </a:pPr>
+            <a:r>
+              <a:rPr lang="ko"/>
+              <a:t>1주차 : 프로젝트 선정                                            </a:t>
+            </a:r>
+            <a:r>
+              <a:rPr lang="ko"/>
+              <a:t>7주차 : 프로그래밍</a:t>
+            </a:r>
+          </a:p>
+          <a:p>
+            <a:pPr lvl="0">
+              <a:spcBef>
+                <a:spcPts val="0"/>
+              </a:spcBef>
+              <a:buNone/>
+            </a:pPr>
+            <a:r>
+              <a:rPr lang="ko"/>
+              <a:t>2주차 : 프로젝트 계획서 작성                                </a:t>
+            </a:r>
+            <a:r>
+              <a:rPr lang="ko"/>
+              <a:t>8주차 : 디자인 초안</a:t>
+            </a:r>
+          </a:p>
+          <a:p>
+            <a:pPr lvl="0">
+              <a:spcBef>
+                <a:spcPts val="0"/>
+              </a:spcBef>
+              <a:buNone/>
+            </a:pPr>
+            <a:r>
+              <a:rPr lang="ko"/>
+              <a:t>3주차 : 프로젝트 설계 및 부품 리스트 작성, 구입  </a:t>
+            </a:r>
+            <a:r>
+              <a:rPr lang="ko"/>
+              <a:t>9주차 : 디자인 초안</a:t>
+            </a:r>
+          </a:p>
+          <a:p>
+            <a:pPr lvl="0">
+              <a:spcBef>
+                <a:spcPts val="0"/>
+              </a:spcBef>
+              <a:buNone/>
+            </a:pPr>
+            <a:r>
+              <a:rPr lang="ko"/>
+              <a:t>4주차 : HW/SW 모듈 테스트                                  </a:t>
+            </a:r>
+            <a:r>
+              <a:rPr lang="ko"/>
+              <a:t>10주차 : 디자인 프로토 타입</a:t>
+            </a:r>
+          </a:p>
+          <a:p>
+            <a:pPr lvl="0">
+              <a:spcBef>
+                <a:spcPts val="0"/>
+              </a:spcBef>
+              <a:buNone/>
+            </a:pPr>
+            <a:r>
+              <a:rPr lang="ko"/>
+              <a:t>5주차 : HW/SW 모듈 테스트                                  </a:t>
+            </a:r>
+            <a:r>
+              <a:rPr lang="ko"/>
+              <a:t>11주차 : 프로젝트 테스트</a:t>
+            </a:r>
+          </a:p>
+          <a:p>
+            <a:pPr lvl="0">
+              <a:spcBef>
+                <a:spcPts val="0"/>
+              </a:spcBef>
+              <a:buNone/>
+            </a:pPr>
+            <a:r>
+              <a:rPr lang="ko"/>
+              <a:t>6주차 : 프로그래밍                                                 </a:t>
+            </a:r>
+            <a:r>
+              <a:rPr lang="ko"/>
+              <a:t>12주차 : 프로젝트 완료 보고서</a:t>
+            </a:r>
+          </a:p>
+          <a:p>
+            <a:pPr lvl="0">
+              <a:spcBef>
+                <a:spcPts val="0"/>
+              </a:spcBef>
+              <a:buNone/>
+            </a:pPr>
+            <a:r>
+              <a:t/>
+            </a:r>
+            <a:endParaRPr/>
           </a:p>
         </p:txBody>
       </p:sp>
@@ -4069,6 +5330,285 @@
 </file>
 
 <file path=ppt/theme/theme1.xml><?xml version="1.0" encoding="utf-8"?>
+<a:theme xmlns:a="http://schemas.openxmlformats.org/drawingml/2006/main" xmlns:r="http://schemas.openxmlformats.org/officeDocument/2006/relationships" name="Simple Light">
+  <a:themeElements>
+    <a:clrScheme name="Simple Light">
+      <a:dk1>
+        <a:srgbClr val="000000"/>
+      </a:dk1>
+      <a:lt1>
+        <a:srgbClr val="FFFFFF"/>
+      </a:lt1>
+      <a:dk2>
+        <a:srgbClr val="595959"/>
+      </a:dk2>
+      <a:lt2>
+        <a:srgbClr val="EEEEEE"/>
+      </a:lt2>
+      <a:accent1>
+        <a:srgbClr val="FFAB40"/>
+      </a:accent1>
+      <a:accent2>
+        <a:srgbClr val="212121"/>
+      </a:accent2>
+      <a:accent3>
+        <a:srgbClr val="78909C"/>
+      </a:accent3>
+      <a:accent4>
+        <a:srgbClr val="FFAB40"/>
+      </a:accent4>
+      <a:accent5>
+        <a:srgbClr val="0097A7"/>
+      </a:accent5>
+      <a:accent6>
+        <a:srgbClr val="EEFF41"/>
+      </a:accent6>
+      <a:hlink>
+        <a:srgbClr val="0097A7"/>
+      </a:hlink>
+      <a:folHlink>
+        <a:srgbClr val="0097A7"/>
+      </a:folHlink>
+    </a:clrScheme>
+    <a:fontScheme name="Office">
+      <a:majorFont>
+        <a:latin typeface="Arial"/>
+        <a:ea typeface=""/>
+        <a:cs typeface=""/>
+        <a:font script="Jpan" typeface="ＭＳ Ｐゴシック"/>
+        <a:font script="Hang" typeface="맑은 고딕"/>
+        <a:font script="Hans" typeface="宋体"/>
+        <a:font script="Hant" typeface="新細明體"/>
+        <a:font script="Arab" typeface="Times New Roman"/>
+        <a:font script="Hebr" typeface="Times New Roman"/>
+        <a:font script="Thai" typeface="Angsana New"/>
+        <a:font script="Ethi" typeface="Nyala"/>
+        <a:font script="Beng" typeface="Vrinda"/>
+        <a:font script="Gujr" typeface="Shruti"/>
+        <a:font script="Khmr" typeface="MoolBoran"/>
+        <a:font script="Knda" typeface="Tunga"/>
+        <a:font script="Guru" typeface="Raavi"/>
+        <a:font script="Cans" typeface="Euphemia"/>
+        <a:font script="Cher" typeface="Plantagenet Cherokee"/>
+        <a:font script="Yiii" typeface="Microsoft Yi Baiti"/>
+        <a:font script="Tibt" typeface="Microsoft Himalaya"/>
+        <a:font script="Thaa" typeface="MV Boli"/>
+        <a:font script="Deva" typeface="Mangal"/>
+        <a:font script="Telu" typeface="Gautami"/>
+        <a:font script="Taml" typeface="Latha"/>
+        <a:font script="Syrc" typeface="Estrangelo Edessa"/>
+        <a:font script="Orya" typeface="Kalinga"/>
+        <a:font script="Mlym" typeface="Kartika"/>
+        <a:font script="Laoo" typeface="DokChampa"/>
+        <a:font script="Sinh" typeface="Iskoola Pota"/>
+        <a:font script="Mong" typeface="Mongolian Baiti"/>
+        <a:font script="Viet" typeface="Times New Roman"/>
+        <a:font script="Uigh" typeface="Microsoft Uighur"/>
+        <a:font script="Geor" typeface="Sylfaen"/>
+      </a:majorFont>
+      <a:minorFont>
+        <a:latin typeface="Arial"/>
+        <a:ea typeface=""/>
+        <a:cs typeface=""/>
+        <a:font script="Jpan" typeface="ＭＳ Ｐゴシック"/>
+        <a:font script="Hang" typeface="맑은 고딕"/>
+        <a:font script="Hans" typeface="宋体"/>
+        <a:font script="Hant" typeface="新細明體"/>
+        <a:font script="Arab" typeface="Arial"/>
+        <a:font script="Hebr" typeface="Arial"/>
+        <a:font script="Thai" typeface="Cordia New"/>
+        <a:font script="Ethi" typeface="Nyala"/>
+        <a:font script="Beng" typeface="Vrinda"/>
+        <a:font script="Gujr" typeface="Shruti"/>
+        <a:font script="Khmr" typeface="DaunPenh"/>
+        <a:font script="Knda" typeface="Tunga"/>
+        <a:font script="Guru" typeface="Raavi"/>
+        <a:font script="Cans" typeface="Euphemia"/>
+        <a:font script="Cher" typeface="Plantagenet Cherokee"/>
+        <a:font script="Yiii" typeface="Microsoft Yi Baiti"/>
+        <a:font script="Tibt" typeface="Microsoft Himalaya"/>
+        <a:font script="Thaa" typeface="MV Boli"/>
+        <a:font script="Deva" typeface="Mangal"/>
+        <a:font script="Telu" typeface="Gautami"/>
+        <a:font script="Taml" typeface="Latha"/>
+        <a:font script="Syrc" typeface="Estrangelo Edessa"/>
+        <a:font script="Orya" typeface="Kalinga"/>
+        <a:font script="Mlym" typeface="Kartika"/>
+        <a:font script="Laoo" typeface="DokChampa"/>
+        <a:font script="Sinh" typeface="Iskoola Pota"/>
+        <a:font script="Mong" typeface="Mongolian Baiti"/>
+        <a:font script="Viet" typeface="Arial"/>
+        <a:font script="Uigh" typeface="Microsoft Uighur"/>
+        <a:font script="Geor" typeface="Sylfaen"/>
+      </a:minorFont>
+    </a:fontScheme>
+    <a:fmtScheme name="Office">
+      <a:fillStyleLst>
+        <a:solidFill>
+          <a:schemeClr val="phClr"/>
+        </a:solidFill>
+        <a:gradFill rotWithShape="1">
+          <a:gsLst>
+            <a:gs pos="0">
+              <a:schemeClr val="phClr">
+                <a:tint val="50000"/>
+                <a:satMod val="300000"/>
+              </a:schemeClr>
+            </a:gs>
+            <a:gs pos="35000">
+              <a:schemeClr val="phClr">
+                <a:tint val="37000"/>
+                <a:satMod val="300000"/>
+              </a:schemeClr>
+            </a:gs>
+            <a:gs pos="100000">
+              <a:schemeClr val="phClr">
+                <a:tint val="15000"/>
+                <a:satMod val="350000"/>
+              </a:schemeClr>
+            </a:gs>
+          </a:gsLst>
+          <a:lin ang="16200000" scaled="1"/>
+        </a:gradFill>
+        <a:gradFill rotWithShape="1">
+          <a:gsLst>
+            <a:gs pos="0">
+              <a:schemeClr val="phClr">
+                <a:tint val="100000"/>
+                <a:shade val="100000"/>
+                <a:satMod val="130000"/>
+              </a:schemeClr>
+            </a:gs>
+            <a:gs pos="100000">
+              <a:schemeClr val="phClr">
+                <a:tint val="50000"/>
+                <a:shade val="100000"/>
+                <a:satMod val="350000"/>
+              </a:schemeClr>
+            </a:gs>
+          </a:gsLst>
+          <a:lin ang="16200000" scaled="0"/>
+        </a:gradFill>
+      </a:fillStyleLst>
+      <a:lnStyleLst>
+        <a:ln w="9525" cap="flat" cmpd="sng" algn="ctr">
+          <a:solidFill>
+            <a:schemeClr val="phClr">
+              <a:shade val="95000"/>
+              <a:satMod val="105000"/>
+            </a:schemeClr>
+          </a:solidFill>
+          <a:prstDash val="solid"/>
+        </a:ln>
+        <a:ln w="25400" cap="flat" cmpd="sng" algn="ctr">
+          <a:solidFill>
+            <a:schemeClr val="phClr"/>
+          </a:solidFill>
+          <a:prstDash val="solid"/>
+        </a:ln>
+        <a:ln w="38100" cap="flat" cmpd="sng" algn="ctr">
+          <a:solidFill>
+            <a:schemeClr val="phClr"/>
+          </a:solidFill>
+          <a:prstDash val="solid"/>
+        </a:ln>
+      </a:lnStyleLst>
+      <a:effectStyleLst>
+        <a:effectStyle>
+          <a:effectLst>
+            <a:outerShdw blurRad="40000" dist="20000" dir="5400000" rotWithShape="0">
+              <a:srgbClr val="000000">
+                <a:alpha val="38000"/>
+              </a:srgbClr>
+            </a:outerShdw>
+          </a:effectLst>
+        </a:effectStyle>
+        <a:effectStyle>
+          <a:effectLst>
+            <a:outerShdw blurRad="40000" dist="23000" dir="5400000" rotWithShape="0">
+              <a:srgbClr val="000000">
+                <a:alpha val="35000"/>
+              </a:srgbClr>
+            </a:outerShdw>
+          </a:effectLst>
+        </a:effectStyle>
+        <a:effectStyle>
+          <a:effectLst>
+            <a:outerShdw blurRad="40000" dist="23000" dir="5400000" rotWithShape="0">
+              <a:srgbClr val="000000">
+                <a:alpha val="35000"/>
+              </a:srgbClr>
+            </a:outerShdw>
+          </a:effectLst>
+          <a:scene3d>
+            <a:camera prst="orthographicFront">
+              <a:rot lat="0" lon="0" rev="0"/>
+            </a:camera>
+            <a:lightRig rig="threePt" dir="t">
+              <a:rot lat="0" lon="0" rev="1200000"/>
+            </a:lightRig>
+          </a:scene3d>
+          <a:sp3d>
+            <a:bevelT w="63500" h="25400"/>
+          </a:sp3d>
+        </a:effectStyle>
+      </a:effectStyleLst>
+      <a:bgFillStyleLst>
+        <a:solidFill>
+          <a:schemeClr val="phClr"/>
+        </a:solidFill>
+        <a:gradFill rotWithShape="1">
+          <a:gsLst>
+            <a:gs pos="0">
+              <a:schemeClr val="phClr">
+                <a:tint val="40000"/>
+                <a:satMod val="350000"/>
+              </a:schemeClr>
+            </a:gs>
+            <a:gs pos="40000">
+              <a:schemeClr val="phClr">
+                <a:tint val="45000"/>
+                <a:shade val="99000"/>
+                <a:satMod val="350000"/>
+              </a:schemeClr>
+            </a:gs>
+            <a:gs pos="100000">
+              <a:schemeClr val="phClr">
+                <a:shade val="20000"/>
+                <a:satMod val="255000"/>
+              </a:schemeClr>
+            </a:gs>
+          </a:gsLst>
+          <a:path path="circle">
+            <a:fillToRect l="50000" t="-80000" r="50000" b="180000"/>
+          </a:path>
+        </a:gradFill>
+        <a:gradFill rotWithShape="1">
+          <a:gsLst>
+            <a:gs pos="0">
+              <a:schemeClr val="phClr">
+                <a:tint val="80000"/>
+                <a:satMod val="300000"/>
+              </a:schemeClr>
+            </a:gs>
+            <a:gs pos="100000">
+              <a:schemeClr val="phClr">
+                <a:shade val="30000"/>
+                <a:satMod val="200000"/>
+              </a:schemeClr>
+            </a:gs>
+          </a:gsLst>
+          <a:path path="circle">
+            <a:fillToRect l="50000" t="50000" r="50000" b="50000"/>
+          </a:path>
+        </a:gradFill>
+      </a:bgFillStyleLst>
+    </a:fmtScheme>
+  </a:themeElements>
+</a:theme>
+</file>
+
+<file path=ppt/theme/theme2.xml><?xml version="1.0" encoding="utf-8"?>
 <a:theme xmlns:a="http://schemas.openxmlformats.org/drawingml/2006/main" xmlns:r="http://schemas.openxmlformats.org/officeDocument/2006/relationships" name="Custom Theme">
   <a:themeElements>
     <a:clrScheme name="Default">
@@ -4345,283 +5885,4 @@
     </a:fmtScheme>
   </a:themeElements>
 </a:theme>
-</file>
-
-<file path=ppt/theme/theme2.xml><?xml version="1.0" encoding="utf-8"?>
-<a:theme xmlns:a="http://schemas.openxmlformats.org/drawingml/2006/main" xmlns:r="http://schemas.openxmlformats.org/officeDocument/2006/relationships" name="Simple Light">
-  <a:themeElements>
-    <a:clrScheme name="Simple Light">
-      <a:dk1>
-        <a:srgbClr val="000000"/>
-      </a:dk1>
-      <a:lt1>
-        <a:srgbClr val="FFFFFF"/>
-      </a:lt1>
-      <a:dk2>
-        <a:srgbClr val="595959"/>
-      </a:dk2>
-      <a:lt2>
-        <a:srgbClr val="EEEEEE"/>
-      </a:lt2>
-      <a:accent1>
-        <a:srgbClr val="FFAB40"/>
-      </a:accent1>
-      <a:accent2>
-        <a:srgbClr val="212121"/>
-      </a:accent2>
-      <a:accent3>
-        <a:srgbClr val="78909C"/>
-      </a:accent3>
-      <a:accent4>
-        <a:srgbClr val="FFAB40"/>
-      </a:accent4>
-      <a:accent5>
-        <a:srgbClr val="0097A7"/>
-      </a:accent5>
-      <a:accent6>
-        <a:srgbClr val="EEFF41"/>
-      </a:accent6>
-      <a:hlink>
-        <a:srgbClr val="0097A7"/>
-      </a:hlink>
-      <a:folHlink>
-        <a:srgbClr val="0097A7"/>
-      </a:folHlink>
-    </a:clrScheme>
-    <a:fontScheme name="Office">
-      <a:majorFont>
-        <a:latin typeface="Arial"/>
-        <a:ea typeface=""/>
-        <a:cs typeface=""/>
-        <a:font script="Jpan" typeface="ＭＳ Ｐゴシック"/>
-        <a:font script="Hang" typeface="맑은 고딕"/>
-        <a:font script="Hans" typeface="宋体"/>
-        <a:font script="Hant" typeface="新細明體"/>
-        <a:font script="Arab" typeface="Times New Roman"/>
-        <a:font script="Hebr" typeface="Times New Roman"/>
-        <a:font script="Thai" typeface="Angsana New"/>
-        <a:font script="Ethi" typeface="Nyala"/>
-        <a:font script="Beng" typeface="Vrinda"/>
-        <a:font script="Gujr" typeface="Shruti"/>
-        <a:font script="Khmr" typeface="MoolBoran"/>
-        <a:font script="Knda" typeface="Tunga"/>
-        <a:font script="Guru" typeface="Raavi"/>
-        <a:font script="Cans" typeface="Euphemia"/>
-        <a:font script="Cher" typeface="Plantagenet Cherokee"/>
-        <a:font script="Yiii" typeface="Microsoft Yi Baiti"/>
-        <a:font script="Tibt" typeface="Microsoft Himalaya"/>
-        <a:font script="Thaa" typeface="MV Boli"/>
-        <a:font script="Deva" typeface="Mangal"/>
-        <a:font script="Telu" typeface="Gautami"/>
-        <a:font script="Taml" typeface="Latha"/>
-        <a:font script="Syrc" typeface="Estrangelo Edessa"/>
-        <a:font script="Orya" typeface="Kalinga"/>
-        <a:font script="Mlym" typeface="Kartika"/>
-        <a:font script="Laoo" typeface="DokChampa"/>
-        <a:font script="Sinh" typeface="Iskoola Pota"/>
-        <a:font script="Mong" typeface="Mongolian Baiti"/>
-        <a:font script="Viet" typeface="Times New Roman"/>
-        <a:font script="Uigh" typeface="Microsoft Uighur"/>
-        <a:font script="Geor" typeface="Sylfaen"/>
-      </a:majorFont>
-      <a:minorFont>
-        <a:latin typeface="Arial"/>
-        <a:ea typeface=""/>
-        <a:cs typeface=""/>
-        <a:font script="Jpan" typeface="ＭＳ Ｐゴシック"/>
-        <a:font script="Hang" typeface="맑은 고딕"/>
-        <a:font script="Hans" typeface="宋体"/>
-        <a:font script="Hant" typeface="新細明體"/>
-        <a:font script="Arab" typeface="Arial"/>
-        <a:font script="Hebr" typeface="Arial"/>
-        <a:font script="Thai" typeface="Cordia New"/>
-        <a:font script="Ethi" typeface="Nyala"/>
-        <a:font script="Beng" typeface="Vrinda"/>
-        <a:font script="Gujr" typeface="Shruti"/>
-        <a:font script="Khmr" typeface="DaunPenh"/>
-        <a:font script="Knda" typeface="Tunga"/>
-        <a:font script="Guru" typeface="Raavi"/>
-        <a:font script="Cans" typeface="Euphemia"/>
-        <a:font script="Cher" typeface="Plantagenet Cherokee"/>
-        <a:font script="Yiii" typeface="Microsoft Yi Baiti"/>
-        <a:font script="Tibt" typeface="Microsoft Himalaya"/>
-        <a:font script="Thaa" typeface="MV Boli"/>
-        <a:font script="Deva" typeface="Mangal"/>
-        <a:font script="Telu" typeface="Gautami"/>
-        <a:font script="Taml" typeface="Latha"/>
-        <a:font script="Syrc" typeface="Estrangelo Edessa"/>
-        <a:font script="Orya" typeface="Kalinga"/>
-        <a:font script="Mlym" typeface="Kartika"/>
-        <a:font script="Laoo" typeface="DokChampa"/>
-        <a:font script="Sinh" typeface="Iskoola Pota"/>
-        <a:font script="Mong" typeface="Mongolian Baiti"/>
-        <a:font script="Viet" typeface="Arial"/>
-        <a:font script="Uigh" typeface="Microsoft Uighur"/>
-        <a:font script="Geor" typeface="Sylfaen"/>
-      </a:minorFont>
-    </a:fontScheme>
-    <a:fmtScheme name="Office">
-      <a:fillStyleLst>
-        <a:solidFill>
-          <a:schemeClr val="phClr"/>
-        </a:solidFill>
-        <a:gradFill rotWithShape="1">
-          <a:gsLst>
-            <a:gs pos="0">
-              <a:schemeClr val="phClr">
-                <a:tint val="50000"/>
-                <a:satMod val="300000"/>
-              </a:schemeClr>
-            </a:gs>
-            <a:gs pos="35000">
-              <a:schemeClr val="phClr">
-                <a:tint val="37000"/>
-                <a:satMod val="300000"/>
-              </a:schemeClr>
-            </a:gs>
-            <a:gs pos="100000">
-              <a:schemeClr val="phClr">
-                <a:tint val="15000"/>
-                <a:satMod val="350000"/>
-              </a:schemeClr>
-            </a:gs>
-          </a:gsLst>
-          <a:lin ang="16200000" scaled="1"/>
-        </a:gradFill>
-        <a:gradFill rotWithShape="1">
-          <a:gsLst>
-            <a:gs pos="0">
-              <a:schemeClr val="phClr">
-                <a:tint val="100000"/>
-                <a:shade val="100000"/>
-                <a:satMod val="130000"/>
-              </a:schemeClr>
-            </a:gs>
-            <a:gs pos="100000">
-              <a:schemeClr val="phClr">
-                <a:tint val="50000"/>
-                <a:shade val="100000"/>
-                <a:satMod val="350000"/>
-              </a:schemeClr>
-            </a:gs>
-          </a:gsLst>
-          <a:lin ang="16200000" scaled="0"/>
-        </a:gradFill>
-      </a:fillStyleLst>
-      <a:lnStyleLst>
-        <a:ln w="9525" cap="flat" cmpd="sng" algn="ctr">
-          <a:solidFill>
-            <a:schemeClr val="phClr">
-              <a:shade val="95000"/>
-              <a:satMod val="105000"/>
-            </a:schemeClr>
-          </a:solidFill>
-          <a:prstDash val="solid"/>
-        </a:ln>
-        <a:ln w="25400" cap="flat" cmpd="sng" algn="ctr">
-          <a:solidFill>
-            <a:schemeClr val="phClr"/>
-          </a:solidFill>
-          <a:prstDash val="solid"/>
-        </a:ln>
-        <a:ln w="38100" cap="flat" cmpd="sng" algn="ctr">
-          <a:solidFill>
-            <a:schemeClr val="phClr"/>
-          </a:solidFill>
-          <a:prstDash val="solid"/>
-        </a:ln>
-      </a:lnStyleLst>
-      <a:effectStyleLst>
-        <a:effectStyle>
-          <a:effectLst>
-            <a:outerShdw blurRad="40000" dist="20000" dir="5400000" rotWithShape="0">
-              <a:srgbClr val="000000">
-                <a:alpha val="38000"/>
-              </a:srgbClr>
-            </a:outerShdw>
-          </a:effectLst>
-        </a:effectStyle>
-        <a:effectStyle>
-          <a:effectLst>
-            <a:outerShdw blurRad="40000" dist="23000" dir="5400000" rotWithShape="0">
-              <a:srgbClr val="000000">
-                <a:alpha val="35000"/>
-              </a:srgbClr>
-            </a:outerShdw>
-          </a:effectLst>
-        </a:effectStyle>
-        <a:effectStyle>
-          <a:effectLst>
-            <a:outerShdw blurRad="40000" dist="23000" dir="5400000" rotWithShape="0">
-              <a:srgbClr val="000000">
-                <a:alpha val="35000"/>
-              </a:srgbClr>
-            </a:outerShdw>
-          </a:effectLst>
-          <a:scene3d>
-            <a:camera prst="orthographicFront">
-              <a:rot lat="0" lon="0" rev="0"/>
-            </a:camera>
-            <a:lightRig rig="threePt" dir="t">
-              <a:rot lat="0" lon="0" rev="1200000"/>
-            </a:lightRig>
-          </a:scene3d>
-          <a:sp3d>
-            <a:bevelT w="63500" h="25400"/>
-          </a:sp3d>
-        </a:effectStyle>
-      </a:effectStyleLst>
-      <a:bgFillStyleLst>
-        <a:solidFill>
-          <a:schemeClr val="phClr"/>
-        </a:solidFill>
-        <a:gradFill rotWithShape="1">
-          <a:gsLst>
-            <a:gs pos="0">
-              <a:schemeClr val="phClr">
-                <a:tint val="40000"/>
-                <a:satMod val="350000"/>
-              </a:schemeClr>
-            </a:gs>
-            <a:gs pos="40000">
-              <a:schemeClr val="phClr">
-                <a:tint val="45000"/>
-                <a:shade val="99000"/>
-                <a:satMod val="350000"/>
-              </a:schemeClr>
-            </a:gs>
-            <a:gs pos="100000">
-              <a:schemeClr val="phClr">
-                <a:shade val="20000"/>
-                <a:satMod val="255000"/>
-              </a:schemeClr>
-            </a:gs>
-          </a:gsLst>
-          <a:path path="circle">
-            <a:fillToRect l="50000" t="-80000" r="50000" b="180000"/>
-          </a:path>
-        </a:gradFill>
-        <a:gradFill rotWithShape="1">
-          <a:gsLst>
-            <a:gs pos="0">
-              <a:schemeClr val="phClr">
-                <a:tint val="80000"/>
-                <a:satMod val="300000"/>
-              </a:schemeClr>
-            </a:gs>
-            <a:gs pos="100000">
-              <a:schemeClr val="phClr">
-                <a:shade val="30000"/>
-                <a:satMod val="200000"/>
-              </a:schemeClr>
-            </a:gs>
-          </a:gsLst>
-          <a:path path="circle">
-            <a:fillToRect l="50000" t="50000" r="50000" b="50000"/>
-          </a:path>
-        </a:gradFill>
-      </a:bgFillStyleLst>
-    </a:fmtScheme>
-  </a:themeElements>
-</a:theme>
 </file>
</xml_diff>